<commit_message>
Update Introduction to R Shiny Apps-Dorcas.pptx
</commit_message>
<xml_diff>
--- a/Presenattions/Introduction to R Shiny Apps-Dorcas.pptx
+++ b/Presenattions/Introduction to R Shiny Apps-Dorcas.pptx
@@ -2871,7 +2871,7 @@
           <a:p>
             <a:fld id="{2B86D600-D91D-449A-A12F-13C124F6BB88}" type="datetimeFigureOut">
               <a:rPr lang="en-US" smtClean="0"/>
-              <a:t>12/5/2020</a:t>
+              <a:t>1/29/2021</a:t>
             </a:fld>
             <a:endParaRPr lang="en-US"/>
           </a:p>
@@ -3450,7 +3450,7 @@
           <a:p>
             <a:fld id="{72E40417-44D2-41E0-9F5C-65A9C90A9362}" type="datetimeFigureOut">
               <a:rPr lang="en-US" smtClean="0"/>
-              <a:t>12/5/2020</a:t>
+              <a:t>1/29/2021</a:t>
             </a:fld>
             <a:endParaRPr lang="en-US"/>
           </a:p>
@@ -3648,7 +3648,7 @@
           <a:p>
             <a:fld id="{72E40417-44D2-41E0-9F5C-65A9C90A9362}" type="datetimeFigureOut">
               <a:rPr lang="en-US" smtClean="0"/>
-              <a:t>12/5/2020</a:t>
+              <a:t>1/29/2021</a:t>
             </a:fld>
             <a:endParaRPr lang="en-US"/>
           </a:p>
@@ -3856,7 +3856,7 @@
           <a:p>
             <a:fld id="{72E40417-44D2-41E0-9F5C-65A9C90A9362}" type="datetimeFigureOut">
               <a:rPr lang="en-US" smtClean="0"/>
-              <a:t>12/5/2020</a:t>
+              <a:t>1/29/2021</a:t>
             </a:fld>
             <a:endParaRPr lang="en-US"/>
           </a:p>
@@ -4054,7 +4054,7 @@
           <a:p>
             <a:fld id="{72E40417-44D2-41E0-9F5C-65A9C90A9362}" type="datetimeFigureOut">
               <a:rPr lang="en-US" smtClean="0"/>
-              <a:t>12/5/2020</a:t>
+              <a:t>1/29/2021</a:t>
             </a:fld>
             <a:endParaRPr lang="en-US"/>
           </a:p>
@@ -4329,7 +4329,7 @@
           <a:p>
             <a:fld id="{72E40417-44D2-41E0-9F5C-65A9C90A9362}" type="datetimeFigureOut">
               <a:rPr lang="en-US" smtClean="0"/>
-              <a:t>12/5/2020</a:t>
+              <a:t>1/29/2021</a:t>
             </a:fld>
             <a:endParaRPr lang="en-US"/>
           </a:p>
@@ -4594,7 +4594,7 @@
           <a:p>
             <a:fld id="{72E40417-44D2-41E0-9F5C-65A9C90A9362}" type="datetimeFigureOut">
               <a:rPr lang="en-US" smtClean="0"/>
-              <a:t>12/5/2020</a:t>
+              <a:t>1/29/2021</a:t>
             </a:fld>
             <a:endParaRPr lang="en-US"/>
           </a:p>
@@ -5006,7 +5006,7 @@
           <a:p>
             <a:fld id="{72E40417-44D2-41E0-9F5C-65A9C90A9362}" type="datetimeFigureOut">
               <a:rPr lang="en-US" smtClean="0"/>
-              <a:t>12/5/2020</a:t>
+              <a:t>1/29/2021</a:t>
             </a:fld>
             <a:endParaRPr lang="en-US"/>
           </a:p>
@@ -5147,7 +5147,7 @@
           <a:p>
             <a:fld id="{72E40417-44D2-41E0-9F5C-65A9C90A9362}" type="datetimeFigureOut">
               <a:rPr lang="en-US" smtClean="0"/>
-              <a:t>12/5/2020</a:t>
+              <a:t>1/29/2021</a:t>
             </a:fld>
             <a:endParaRPr lang="en-US"/>
           </a:p>
@@ -5260,7 +5260,7 @@
           <a:p>
             <a:fld id="{72E40417-44D2-41E0-9F5C-65A9C90A9362}" type="datetimeFigureOut">
               <a:rPr lang="en-US" smtClean="0"/>
-              <a:t>12/5/2020</a:t>
+              <a:t>1/29/2021</a:t>
             </a:fld>
             <a:endParaRPr lang="en-US"/>
           </a:p>
@@ -5571,7 +5571,7 @@
           <a:p>
             <a:fld id="{72E40417-44D2-41E0-9F5C-65A9C90A9362}" type="datetimeFigureOut">
               <a:rPr lang="en-US" smtClean="0"/>
-              <a:t>12/5/2020</a:t>
+              <a:t>1/29/2021</a:t>
             </a:fld>
             <a:endParaRPr lang="en-US"/>
           </a:p>
@@ -5859,7 +5859,7 @@
           <a:p>
             <a:fld id="{72E40417-44D2-41E0-9F5C-65A9C90A9362}" type="datetimeFigureOut">
               <a:rPr lang="en-US" smtClean="0"/>
-              <a:t>12/5/2020</a:t>
+              <a:t>1/29/2021</a:t>
             </a:fld>
             <a:endParaRPr lang="en-US"/>
           </a:p>
@@ -6100,7 +6100,7 @@
           <a:p>
             <a:fld id="{72E40417-44D2-41E0-9F5C-65A9C90A9362}" type="datetimeFigureOut">
               <a:rPr lang="en-US" smtClean="0"/>
-              <a:t>12/5/2020</a:t>
+              <a:t>1/29/2021</a:t>
             </a:fld>
             <a:endParaRPr lang="en-US"/>
           </a:p>
@@ -8258,7 +8258,7 @@
               <a:rPr lang="en-US" dirty="0">
                 <a:hlinkClick r:id="rId2"/>
               </a:rPr>
-              <a:t>https://github.com/DeeKareithi/R-Ladies-Siny-App-Class/tree/master/Data</a:t>
+              <a:t>https://github.com/DeeKareithi/R-Ladies-Shiny-App-Class/tree/master/Data</a:t>
             </a:r>
             <a:r>
               <a:rPr lang="en-US" dirty="0"/>

</xml_diff>